<commit_message>
added classification comparision chart
</commit_message>
<xml_diff>
--- a/slides/ppt.pptx
+++ b/slides/ppt.pptx
@@ -5,7 +5,7 @@
     <p:sldMasterId id="2147483828" r:id="rId1"/>
   </p:sldMasterIdLst>
   <p:notesMasterIdLst>
-    <p:notesMasterId r:id="rId11"/>
+    <p:notesMasterId r:id="rId13"/>
   </p:notesMasterIdLst>
   <p:sldIdLst>
     <p:sldId id="256" r:id="rId2"/>
@@ -17,6 +17,8 @@
     <p:sldId id="262" r:id="rId8"/>
     <p:sldId id="263" r:id="rId9"/>
     <p:sldId id="264" r:id="rId10"/>
+    <p:sldId id="265" r:id="rId11"/>
+    <p:sldId id="266" r:id="rId12"/>
   </p:sldIdLst>
   <p:sldSz cx="12192000" cy="6858000"/>
   <p:notesSz cx="6858000" cy="9144000"/>
@@ -7596,6 +7598,198 @@
     <p:extLst>
       <p:ext uri="{BB962C8B-B14F-4D97-AF65-F5344CB8AC3E}">
         <p14:creationId xmlns:p14="http://schemas.microsoft.com/office/powerpoint/2010/main" val="723289490"/>
+      </p:ext>
+    </p:extLst>
+  </p:cSld>
+  <p:clrMapOvr>
+    <a:masterClrMapping/>
+  </p:clrMapOvr>
+</p:sld>
+</file>
+
+<file path=ppt/slides/slide10.xml><?xml version="1.0" encoding="utf-8"?>
+<p:sld xmlns:a="http://schemas.openxmlformats.org/drawingml/2006/main" xmlns:r="http://schemas.openxmlformats.org/officeDocument/2006/relationships" xmlns:p="http://schemas.openxmlformats.org/presentationml/2006/main">
+  <p:cSld>
+    <p:spTree>
+      <p:nvGrpSpPr>
+        <p:cNvPr id="1" name=""/>
+        <p:cNvGrpSpPr/>
+        <p:nvPr/>
+      </p:nvGrpSpPr>
+      <p:grpSpPr>
+        <a:xfrm>
+          <a:off x="0" y="0"/>
+          <a:ext cx="0" cy="0"/>
+          <a:chOff x="0" y="0"/>
+          <a:chExt cx="0" cy="0"/>
+        </a:xfrm>
+      </p:grpSpPr>
+      <p:sp>
+        <p:nvSpPr>
+          <p:cNvPr id="2" name="Title 1">
+            <a:extLst>
+              <a:ext uri="{FF2B5EF4-FFF2-40B4-BE49-F238E27FC236}">
+                <a16:creationId xmlns:a16="http://schemas.microsoft.com/office/drawing/2014/main" id="{86CF4E22-7BA3-4550-AEFA-A3F38BD2F767}"/>
+              </a:ext>
+            </a:extLst>
+          </p:cNvPr>
+          <p:cNvSpPr>
+            <a:spLocks noGrp="1"/>
+          </p:cNvSpPr>
+          <p:nvPr>
+            <p:ph type="title"/>
+          </p:nvPr>
+        </p:nvSpPr>
+        <p:spPr>
+          <a:xfrm>
+            <a:off x="1251678" y="382385"/>
+            <a:ext cx="10178322" cy="721528"/>
+          </a:xfrm>
+        </p:spPr>
+        <p:txBody>
+          <a:bodyPr>
+            <a:normAutofit fontScale="90000"/>
+          </a:bodyPr>
+          <a:lstStyle/>
+          <a:p>
+            <a:r>
+              <a:rPr lang="en-US" dirty="0"/>
+              <a:t>Compare Different Classification</a:t>
+            </a:r>
+          </a:p>
+        </p:txBody>
+      </p:sp>
+      <p:pic>
+        <p:nvPicPr>
+          <p:cNvPr id="5" name="Content Placeholder 4" descr="A picture containing pencil&#10;&#10;Description automatically generated">
+            <a:extLst>
+              <a:ext uri="{FF2B5EF4-FFF2-40B4-BE49-F238E27FC236}">
+                <a16:creationId xmlns:a16="http://schemas.microsoft.com/office/drawing/2014/main" id="{2C1EA87C-D115-44B9-B998-5900DC99A2BD}"/>
+              </a:ext>
+            </a:extLst>
+          </p:cNvPr>
+          <p:cNvPicPr>
+            <a:picLocks noGrp="1" noChangeAspect="1"/>
+          </p:cNvPicPr>
+          <p:nvPr>
+            <p:ph idx="1"/>
+          </p:nvPr>
+        </p:nvPicPr>
+        <p:blipFill>
+          <a:blip r:embed="rId2"/>
+          <a:stretch>
+            <a:fillRect/>
+          </a:stretch>
+        </p:blipFill>
+        <p:spPr>
+          <a:xfrm>
+            <a:off x="2854325" y="1231900"/>
+            <a:ext cx="6972300" cy="4648200"/>
+          </a:xfrm>
+        </p:spPr>
+      </p:pic>
+    </p:spTree>
+    <p:extLst>
+      <p:ext uri="{BB962C8B-B14F-4D97-AF65-F5344CB8AC3E}">
+        <p14:creationId xmlns:p14="http://schemas.microsoft.com/office/powerpoint/2010/main" val="43212349"/>
+      </p:ext>
+    </p:extLst>
+  </p:cSld>
+  <p:clrMapOvr>
+    <a:masterClrMapping/>
+  </p:clrMapOvr>
+</p:sld>
+</file>
+
+<file path=ppt/slides/slide11.xml><?xml version="1.0" encoding="utf-8"?>
+<p:sld xmlns:a="http://schemas.openxmlformats.org/drawingml/2006/main" xmlns:r="http://schemas.openxmlformats.org/officeDocument/2006/relationships" xmlns:p="http://schemas.openxmlformats.org/presentationml/2006/main">
+  <p:cSld>
+    <p:spTree>
+      <p:nvGrpSpPr>
+        <p:cNvPr id="1" name=""/>
+        <p:cNvGrpSpPr/>
+        <p:nvPr/>
+      </p:nvGrpSpPr>
+      <p:grpSpPr>
+        <a:xfrm>
+          <a:off x="0" y="0"/>
+          <a:ext cx="0" cy="0"/>
+          <a:chOff x="0" y="0"/>
+          <a:chExt cx="0" cy="0"/>
+        </a:xfrm>
+      </p:grpSpPr>
+      <p:sp>
+        <p:nvSpPr>
+          <p:cNvPr id="2" name="Title 1">
+            <a:extLst>
+              <a:ext uri="{FF2B5EF4-FFF2-40B4-BE49-F238E27FC236}">
+                <a16:creationId xmlns:a16="http://schemas.microsoft.com/office/drawing/2014/main" id="{86CF4E22-7BA3-4550-AEFA-A3F38BD2F767}"/>
+              </a:ext>
+            </a:extLst>
+          </p:cNvPr>
+          <p:cNvSpPr>
+            <a:spLocks noGrp="1"/>
+          </p:cNvSpPr>
+          <p:nvPr>
+            <p:ph type="title"/>
+          </p:nvPr>
+        </p:nvSpPr>
+        <p:spPr>
+          <a:xfrm>
+            <a:off x="1251678" y="382385"/>
+            <a:ext cx="10178322" cy="721528"/>
+          </a:xfrm>
+        </p:spPr>
+        <p:txBody>
+          <a:bodyPr>
+            <a:normAutofit fontScale="90000"/>
+          </a:bodyPr>
+          <a:lstStyle/>
+          <a:p>
+            <a:r>
+              <a:rPr lang="en-US" dirty="0"/>
+              <a:t>L1 and L2 </a:t>
+            </a:r>
+            <a:r>
+              <a:rPr lang="en-US"/>
+              <a:t>regularization Logistic</a:t>
+            </a:r>
+            <a:endParaRPr lang="en-US" dirty="0"/>
+          </a:p>
+        </p:txBody>
+      </p:sp>
+      <p:pic>
+        <p:nvPicPr>
+          <p:cNvPr id="5" name="Content Placeholder 4">
+            <a:extLst>
+              <a:ext uri="{FF2B5EF4-FFF2-40B4-BE49-F238E27FC236}">
+                <a16:creationId xmlns:a16="http://schemas.microsoft.com/office/drawing/2014/main" id="{2C1EA87C-D115-44B9-B998-5900DC99A2BD}"/>
+              </a:ext>
+            </a:extLst>
+          </p:cNvPr>
+          <p:cNvPicPr>
+            <a:picLocks noGrp="1" noChangeAspect="1"/>
+          </p:cNvPicPr>
+          <p:nvPr>
+            <p:ph idx="1"/>
+          </p:nvPr>
+        </p:nvPicPr>
+        <p:blipFill>
+          <a:blip r:embed="rId2"/>
+          <a:srcRect/>
+          <a:stretch/>
+        </p:blipFill>
+        <p:spPr>
+          <a:xfrm>
+            <a:off x="2854325" y="1231900"/>
+            <a:ext cx="6972300" cy="4648200"/>
+          </a:xfrm>
+        </p:spPr>
+      </p:pic>
+    </p:spTree>
+    <p:extLst>
+      <p:ext uri="{BB962C8B-B14F-4D97-AF65-F5344CB8AC3E}">
+        <p14:creationId xmlns:p14="http://schemas.microsoft.com/office/powerpoint/2010/main" val="4156722788"/>
       </p:ext>
     </p:extLst>
   </p:cSld>

</xml_diff>